<commit_message>
Slide about shopping behaviour literature resarch
</commit_message>
<xml_diff>
--- a/usabilityEngineering/A1/SC_literatureResearch.pptx
+++ b/usabilityEngineering/A1/SC_literatureResearch.pptx
@@ -1,13 +1,12 @@
 
 <file path=ppt/presentation.xml><?xml version="1.0" encoding="utf-8"?>
-<p:presentation xmlns:a="http://schemas.openxmlformats.org/drawingml/2006/main" xmlns:r="http://schemas.openxmlformats.org/officeDocument/2006/relationships" xmlns:p="http://schemas.openxmlformats.org/presentationml/2006/main" autoCompressPictures="0">
+<p:presentation xmlns:a="http://schemas.openxmlformats.org/drawingml/2006/main" xmlns:r="http://schemas.openxmlformats.org/officeDocument/2006/relationships" xmlns:p="http://schemas.openxmlformats.org/presentationml/2006/main" saveSubsetFonts="1" autoCompressPictures="0">
   <p:sldMasterIdLst>
     <p:sldMasterId id="2147483684" r:id="rId1"/>
   </p:sldMasterIdLst>
   <p:sldIdLst>
     <p:sldId id="256" r:id="rId2"/>
-    <p:sldId id="259" r:id="rId3"/>
-    <p:sldId id="260" r:id="rId4"/>
+    <p:sldId id="260" r:id="rId3"/>
   </p:sldIdLst>
   <p:sldSz cx="12192000" cy="6858000"/>
   <p:notesSz cx="6858000" cy="9144000"/>
@@ -106,6 +105,11 @@
       </a:defRPr>
     </a:lvl9pPr>
   </p:defaultTextStyle>
+  <p:extLst>
+    <p:ext uri="{EFAFB233-063F-42B5-8137-9DF3F51BA10A}">
+      <p15:sldGuideLst xmlns:p15="http://schemas.microsoft.com/office/powerpoint/2012/main"/>
+    </p:ext>
+  </p:extLst>
 </p:presentation>
 </file>
 
@@ -305,7 +309,7 @@
           <a:p>
             <a:fld id="{96DFF08F-DC6B-4601-B491-B0F83F6DD2DA}" type="datetimeFigureOut">
               <a:rPr lang="en-US" dirty="0"/>
-              <a:t>11/8/2016</a:t>
+              <a:t>11/9/16</a:t>
             </a:fld>
             <a:endParaRPr lang="en-US" dirty="0"/>
           </a:p>
@@ -521,7 +525,7 @@
           <a:p>
             <a:fld id="{96DFF08F-DC6B-4601-B491-B0F83F6DD2DA}" type="datetimeFigureOut">
               <a:rPr lang="en-US" dirty="0"/>
-              <a:t>11/8/2016</a:t>
+              <a:t>11/9/16</a:t>
             </a:fld>
             <a:endParaRPr lang="en-US" dirty="0"/>
           </a:p>
@@ -696,7 +700,7 @@
           <a:p>
             <a:fld id="{96DFF08F-DC6B-4601-B491-B0F83F6DD2DA}" type="datetimeFigureOut">
               <a:rPr lang="en-US" dirty="0"/>
-              <a:t>11/8/2016</a:t>
+              <a:t>11/9/16</a:t>
             </a:fld>
             <a:endParaRPr lang="en-US" dirty="0"/>
           </a:p>
@@ -861,7 +865,7 @@
           <a:p>
             <a:fld id="{96DFF08F-DC6B-4601-B491-B0F83F6DD2DA}" type="datetimeFigureOut">
               <a:rPr lang="en-US" dirty="0"/>
-              <a:t>11/8/2016</a:t>
+              <a:t>11/9/16</a:t>
             </a:fld>
             <a:endParaRPr lang="en-US" dirty="0"/>
           </a:p>
@@ -1107,7 +1111,7 @@
           <a:p>
             <a:fld id="{96DFF08F-DC6B-4601-B491-B0F83F6DD2DA}" type="datetimeFigureOut">
               <a:rPr lang="en-US" dirty="0"/>
-              <a:t>11/8/2016</a:t>
+              <a:t>11/9/16</a:t>
             </a:fld>
             <a:endParaRPr lang="en-US" dirty="0"/>
           </a:p>
@@ -1425,7 +1429,7 @@
           <a:p>
             <a:fld id="{96DFF08F-DC6B-4601-B491-B0F83F6DD2DA}" type="datetimeFigureOut">
               <a:rPr lang="en-US" dirty="0"/>
-              <a:t>11/8/2016</a:t>
+              <a:t>11/9/16</a:t>
             </a:fld>
             <a:endParaRPr lang="en-US" dirty="0"/>
           </a:p>
@@ -1844,7 +1848,7 @@
           <a:p>
             <a:fld id="{96DFF08F-DC6B-4601-B491-B0F83F6DD2DA}" type="datetimeFigureOut">
               <a:rPr lang="en-US" dirty="0"/>
-              <a:t>11/8/2016</a:t>
+              <a:t>11/9/16</a:t>
             </a:fld>
             <a:endParaRPr lang="en-US" dirty="0"/>
           </a:p>
@@ -1957,7 +1961,7 @@
           <a:p>
             <a:fld id="{96DFF08F-DC6B-4601-B491-B0F83F6DD2DA}" type="datetimeFigureOut">
               <a:rPr lang="en-US" dirty="0"/>
-              <a:t>11/8/2016</a:t>
+              <a:t>11/9/16</a:t>
             </a:fld>
             <a:endParaRPr lang="en-US" dirty="0"/>
           </a:p>
@@ -2047,7 +2051,7 @@
           <a:p>
             <a:fld id="{96DFF08F-DC6B-4601-B491-B0F83F6DD2DA}" type="datetimeFigureOut">
               <a:rPr lang="en-US" dirty="0"/>
-              <a:t>11/8/2016</a:t>
+              <a:t>11/9/16</a:t>
             </a:fld>
             <a:endParaRPr lang="en-US" dirty="0"/>
           </a:p>
@@ -2332,7 +2336,7 @@
           <a:p>
             <a:fld id="{96DFF08F-DC6B-4601-B491-B0F83F6DD2DA}" type="datetimeFigureOut">
               <a:rPr lang="en-US" dirty="0"/>
-              <a:t>11/8/2016</a:t>
+              <a:t>11/9/16</a:t>
             </a:fld>
             <a:endParaRPr lang="en-US" dirty="0"/>
           </a:p>
@@ -2599,7 +2603,7 @@
           <a:p>
             <a:fld id="{96DFF08F-DC6B-4601-B491-B0F83F6DD2DA}" type="datetimeFigureOut">
               <a:rPr lang="en-US" dirty="0"/>
-              <a:t>11/8/2016</a:t>
+              <a:t>11/9/16</a:t>
             </a:fld>
             <a:endParaRPr lang="en-US" dirty="0"/>
           </a:p>
@@ -2849,7 +2853,7 @@
             <a:fld id="{96DFF08F-DC6B-4601-B491-B0F83F6DD2DA}" type="datetimeFigureOut">
               <a:rPr lang="en-US" dirty="0"/>
               <a:pPr/>
-              <a:t>11/8/2016</a:t>
+              <a:t>11/9/16</a:t>
             </a:fld>
             <a:endParaRPr lang="en-US" dirty="0"/>
           </a:p>
@@ -3325,12 +3329,20 @@
               <a:rPr lang="de-DE" sz="2400" dirty="0" err="1"/>
               <a:t>Literature</a:t>
             </a:r>
+            <a:r>
+              <a:rPr lang="de-DE" sz="2400" dirty="0"/>
+              <a:t/>
+            </a:r>
             <a:br>
               <a:rPr lang="de-DE" sz="2400" dirty="0"/>
             </a:br>
             <a:r>
               <a:rPr lang="de-DE" sz="2400" dirty="0"/>
               <a:t>-</a:t>
+            </a:r>
+            <a:r>
+              <a:rPr lang="de-DE" dirty="0"/>
+              <a:t/>
             </a:r>
             <a:br>
               <a:rPr lang="de-DE" dirty="0"/>
@@ -3461,18 +3473,10 @@
           <a:lstStyle/>
           <a:p>
             <a:r>
-              <a:rPr lang="de-DE" dirty="0" err="1"/>
-              <a:t>Example</a:t>
-            </a:r>
-            <a:r>
-              <a:rPr lang="de-DE" dirty="0"/>
-              <a:t> </a:t>
-            </a:r>
-            <a:r>
-              <a:rPr lang="de-DE" dirty="0" err="1"/>
-              <a:t>slide</a:t>
-            </a:r>
-            <a:endParaRPr lang="de-DE" dirty="0"/>
+              <a:rPr lang="en-US" dirty="0" smtClean="0"/>
+              <a:t>Shopping Behavior</a:t>
+            </a:r>
+            <a:endParaRPr lang="en-US" dirty="0"/>
           </a:p>
         </p:txBody>
       </p:sp>
@@ -3497,15 +3501,22 @@
           <a:lstStyle/>
           <a:p>
             <a:r>
-              <a:rPr lang="de-DE" dirty="0">
+              <a:rPr lang="en-US" dirty="0" smtClean="0">
                 <a:solidFill>
                   <a:schemeClr val="accent4">
                     <a:lumMod val="75000"/>
                   </a:schemeClr>
                 </a:solidFill>
               </a:rPr>
-              <a:t>Das Template</a:t>
-            </a:r>
+              <a:t>An exploratory study of grocery shopping stressors</a:t>
+            </a:r>
+            <a:endParaRPr lang="en-US" dirty="0">
+              <a:solidFill>
+                <a:schemeClr val="accent4">
+                  <a:lumMod val="75000"/>
+                </a:schemeClr>
+              </a:solidFill>
+            </a:endParaRPr>
           </a:p>
         </p:txBody>
       </p:sp>
@@ -3521,108 +3532,39 @@
         </p:nvSpPr>
         <p:spPr>
           <a:xfrm>
-            <a:off x="1143000" y="2721483"/>
-            <a:ext cx="8210550" cy="1332000"/>
+            <a:off x="1143000" y="3032014"/>
+            <a:ext cx="8210550" cy="2474794"/>
           </a:xfrm>
         </p:spPr>
         <p:txBody>
-          <a:bodyPr/>
-          <a:lstStyle/>
-          <a:p>
-            <a:r>
-              <a:rPr lang="de-DE" dirty="0"/>
-              <a:t>Das </a:t>
-            </a:r>
-            <a:r>
-              <a:rPr lang="de-DE" dirty="0" err="1"/>
-              <a:t>template</a:t>
-            </a:r>
-            <a:r>
-              <a:rPr lang="de-DE" dirty="0"/>
-              <a:t> zum Ausfüllen findet ihr auf der nächsten Seite</a:t>
-            </a:r>
-          </a:p>
-          <a:p>
-            <a:r>
-              <a:rPr lang="de-DE" dirty="0"/>
-              <a:t>Das ist super. </a:t>
-            </a:r>
-          </a:p>
-        </p:txBody>
-      </p:sp>
-      <p:sp>
-        <p:nvSpPr>
-          <p:cNvPr id="5" name="Textplatzhalter 4"/>
-          <p:cNvSpPr>
-            <a:spLocks noGrp="1"/>
-          </p:cNvSpPr>
-          <p:nvPr>
-            <p:ph type="body" sz="quarter" idx="3"/>
-          </p:nvPr>
-        </p:nvSpPr>
-        <p:spPr>
-          <a:xfrm>
-            <a:off x="1143000" y="4395455"/>
-            <a:ext cx="7296150" cy="756000"/>
-          </a:xfrm>
-        </p:spPr>
-        <p:txBody>
-          <a:bodyPr/>
-          <a:lstStyle/>
-          <a:p>
-            <a:r>
-              <a:rPr lang="de-DE" dirty="0">
-                <a:solidFill>
-                  <a:schemeClr val="accent4">
-                    <a:lumMod val="75000"/>
-                  </a:schemeClr>
-                </a:solidFill>
-              </a:rPr>
-              <a:t>Die Sprache</a:t>
-            </a:r>
-          </a:p>
-        </p:txBody>
-      </p:sp>
-      <p:sp>
-        <p:nvSpPr>
-          <p:cNvPr id="6" name="Inhaltsplatzhalter 5"/>
-          <p:cNvSpPr>
-            <a:spLocks noGrp="1"/>
-          </p:cNvSpPr>
-          <p:nvPr>
-            <p:ph sz="quarter" idx="4"/>
-          </p:nvPr>
-        </p:nvSpPr>
-        <p:spPr>
-          <a:xfrm>
-            <a:off x="1143000" y="5115425"/>
-            <a:ext cx="8210550" cy="1332000"/>
-          </a:xfrm>
-        </p:spPr>
-        <p:txBody>
           <a:bodyPr>
-            <a:normAutofit/>
+            <a:normAutofit lnSpcReduction="10000"/>
           </a:bodyPr>
           <a:lstStyle/>
           <a:p>
             <a:r>
-              <a:rPr lang="de-DE" dirty="0"/>
-              <a:t>Ilhan wünscht sich englische Doku. Das ist blöd</a:t>
-            </a:r>
-          </a:p>
-          <a:p>
-            <a:r>
-              <a:rPr lang="de-DE" dirty="0"/>
-              <a:t>Aber man kann ja auch Bilder zum Veranschaulichen verwenden anstatt </a:t>
-            </a:r>
-            <a:r>
-              <a:rPr lang="de-DE" dirty="0" err="1"/>
-              <a:t>text</a:t>
-            </a:r>
-            <a:r>
-              <a:rPr lang="de-DE" dirty="0"/>
-              <a:t>.</a:t>
-            </a:r>
+              <a:rPr lang="en-US" dirty="0" smtClean="0"/>
+              <a:t>Time pressure is seen as the main cause of shopping stress.</a:t>
+            </a:r>
+          </a:p>
+          <a:p>
+            <a:endParaRPr lang="en-US" sz="600" dirty="0" smtClean="0"/>
+          </a:p>
+          <a:p>
+            <a:r>
+              <a:rPr lang="en-US" dirty="0" smtClean="0"/>
+              <a:t>Most respondents associate more stress with grocery shopping than other forms of shopping.</a:t>
+            </a:r>
+          </a:p>
+          <a:p>
+            <a:endParaRPr lang="en-US" sz="600" dirty="0" smtClean="0"/>
+          </a:p>
+          <a:p>
+            <a:r>
+              <a:rPr lang="en-US" dirty="0" smtClean="0"/>
+              <a:t>One important group of stressors is linked to overpriced goods, lack of money and too much choice.</a:t>
+            </a:r>
+            <a:endParaRPr lang="en-US" dirty="0"/>
           </a:p>
         </p:txBody>
       </p:sp>
@@ -3674,211 +3616,102 @@
           </a:extLst>
         </p:spPr>
       </p:pic>
-    </p:spTree>
-    <p:extLst>
-      <p:ext uri="{BB962C8B-B14F-4D97-AF65-F5344CB8AC3E}">
-        <p14:creationId xmlns:p14="http://schemas.microsoft.com/office/powerpoint/2010/main" val="1597652902"/>
-      </p:ext>
-    </p:extLst>
-  </p:cSld>
-  <p:clrMapOvr>
-    <a:masterClrMapping/>
-  </p:clrMapOvr>
-</p:sld>
-</file>
-
-<file path=ppt/slides/slide3.xml><?xml version="1.0" encoding="utf-8"?>
-<p:sld xmlns:a="http://schemas.openxmlformats.org/drawingml/2006/main" xmlns:r="http://schemas.openxmlformats.org/officeDocument/2006/relationships" xmlns:p="http://schemas.openxmlformats.org/presentationml/2006/main">
-  <p:cSld>
-    <p:spTree>
-      <p:nvGrpSpPr>
-        <p:cNvPr id="1" name=""/>
-        <p:cNvGrpSpPr/>
-        <p:nvPr/>
-      </p:nvGrpSpPr>
-      <p:grpSpPr>
-        <a:xfrm>
-          <a:off x="0" y="0"/>
-          <a:ext cx="0" cy="0"/>
-          <a:chOff x="0" y="0"/>
-          <a:chExt cx="0" cy="0"/>
-        </a:xfrm>
-      </p:grpSpPr>
-      <p:sp>
-        <p:nvSpPr>
-          <p:cNvPr id="2" name="Titel 1"/>
-          <p:cNvSpPr>
-            <a:spLocks noGrp="1"/>
-          </p:cNvSpPr>
-          <p:nvPr>
-            <p:ph type="title"/>
-          </p:nvPr>
-        </p:nvSpPr>
-        <p:spPr/>
-        <p:txBody>
-          <a:bodyPr/>
-          <a:lstStyle/>
-          <a:p>
-            <a:endParaRPr lang="de-DE"/>
-          </a:p>
-        </p:txBody>
-      </p:sp>
-      <p:sp>
-        <p:nvSpPr>
-          <p:cNvPr id="3" name="Textplatzhalter 2"/>
-          <p:cNvSpPr>
-            <a:spLocks noGrp="1"/>
-          </p:cNvSpPr>
-          <p:nvPr>
-            <p:ph type="body" idx="1"/>
-          </p:nvPr>
-        </p:nvSpPr>
-        <p:spPr>
-          <a:xfrm>
-            <a:off x="1143000" y="2001511"/>
-            <a:ext cx="7296150" cy="756000"/>
-          </a:xfrm>
-        </p:spPr>
-        <p:txBody>
-          <a:bodyPr/>
-          <a:lstStyle/>
-          <a:p>
-            <a:endParaRPr lang="de-DE" dirty="0">
-              <a:solidFill>
-                <a:schemeClr val="accent4">
-                  <a:lumMod val="75000"/>
-                </a:schemeClr>
-              </a:solidFill>
-            </a:endParaRPr>
-          </a:p>
-        </p:txBody>
-      </p:sp>
-      <p:sp>
-        <p:nvSpPr>
-          <p:cNvPr id="4" name="Inhaltsplatzhalter 3"/>
-          <p:cNvSpPr>
-            <a:spLocks noGrp="1"/>
-          </p:cNvSpPr>
-          <p:nvPr>
-            <p:ph sz="half" idx="2"/>
-          </p:nvPr>
-        </p:nvSpPr>
-        <p:spPr>
-          <a:xfrm>
-            <a:off x="1143000" y="2721483"/>
-            <a:ext cx="8210550" cy="1332000"/>
-          </a:xfrm>
-        </p:spPr>
-        <p:txBody>
-          <a:bodyPr/>
-          <a:lstStyle/>
-          <a:p>
-            <a:endParaRPr lang="de-DE" dirty="0"/>
-          </a:p>
-        </p:txBody>
-      </p:sp>
-      <p:sp>
-        <p:nvSpPr>
-          <p:cNvPr id="5" name="Textplatzhalter 4"/>
-          <p:cNvSpPr>
-            <a:spLocks noGrp="1"/>
-          </p:cNvSpPr>
-          <p:nvPr>
-            <p:ph type="body" sz="quarter" idx="3"/>
-          </p:nvPr>
-        </p:nvSpPr>
-        <p:spPr>
-          <a:xfrm>
-            <a:off x="1143000" y="4395455"/>
-            <a:ext cx="7296150" cy="756000"/>
-          </a:xfrm>
-        </p:spPr>
-        <p:txBody>
-          <a:bodyPr/>
-          <a:lstStyle/>
-          <a:p>
-            <a:endParaRPr lang="de-DE" dirty="0">
-              <a:solidFill>
-                <a:schemeClr val="accent4">
-                  <a:lumMod val="75000"/>
-                </a:schemeClr>
-              </a:solidFill>
-            </a:endParaRPr>
-          </a:p>
-        </p:txBody>
-      </p:sp>
-      <p:sp>
-        <p:nvSpPr>
-          <p:cNvPr id="6" name="Inhaltsplatzhalter 5"/>
-          <p:cNvSpPr>
-            <a:spLocks noGrp="1"/>
-          </p:cNvSpPr>
-          <p:nvPr>
-            <p:ph sz="quarter" idx="4"/>
-          </p:nvPr>
-        </p:nvSpPr>
-        <p:spPr>
-          <a:xfrm>
-            <a:off x="1143000" y="5115425"/>
-            <a:ext cx="8210550" cy="1332000"/>
-          </a:xfrm>
-        </p:spPr>
-        <p:txBody>
-          <a:bodyPr/>
-          <a:lstStyle/>
-          <a:p>
-            <a:endParaRPr lang="de-DE" dirty="0"/>
-          </a:p>
-        </p:txBody>
-      </p:sp>
       <p:pic>
         <p:nvPicPr>
-          <p:cNvPr id="7" name="Picture 2" descr="https://d30y9cdsu7xlg0.cloudfront.net/png/34626-200.png"/>
+          <p:cNvPr id="10" name="Bild 9"/>
           <p:cNvPicPr>
-            <a:picLocks noChangeAspect="1" noChangeArrowheads="1"/>
+            <a:picLocks noChangeAspect="1"/>
           </p:cNvPicPr>
           <p:nvPr/>
         </p:nvPicPr>
         <p:blipFill>
-          <a:blip r:embed="rId2">
-            <a:duotone>
-              <a:schemeClr val="accent1">
-                <a:shade val="45000"/>
-                <a:satMod val="135000"/>
-              </a:schemeClr>
-              <a:prstClr val="white"/>
-            </a:duotone>
+          <a:blip r:embed="rId3">
             <a:extLst>
               <a:ext uri="{28A0092B-C50C-407E-A947-70E740481C1C}">
                 <a14:useLocalDpi xmlns:a14="http://schemas.microsoft.com/office/drawing/2010/main" val="0"/>
               </a:ext>
             </a:extLst>
           </a:blip>
-          <a:srcRect/>
           <a:stretch>
             <a:fillRect/>
           </a:stretch>
         </p:blipFill>
-        <p:spPr bwMode="auto">
+        <p:spPr>
           <a:xfrm>
-            <a:off x="10294620" y="4901035"/>
-            <a:ext cx="1620000" cy="1620000"/>
+            <a:off x="8918901" y="1122197"/>
+            <a:ext cx="2751438" cy="2751438"/>
+          </a:xfrm>
+          <a:prstGeom prst="rect">
+            <a:avLst/>
+          </a:prstGeom>
+        </p:spPr>
+      </p:pic>
+      <p:sp>
+        <p:nvSpPr>
+          <p:cNvPr id="11" name="Textfeld 10"/>
+          <p:cNvSpPr txBox="1"/>
+          <p:nvPr/>
+        </p:nvSpPr>
+        <p:spPr>
+          <a:xfrm>
+            <a:off x="1143000" y="5781311"/>
+            <a:ext cx="3935436" cy="369332"/>
           </a:xfrm>
           <a:prstGeom prst="rect">
             <a:avLst/>
           </a:prstGeom>
           <a:noFill/>
-          <a:extLst>
-            <a:ext uri="{909E8E84-426E-40DD-AFC4-6F175D3DCCD1}">
-              <a14:hiddenFill xmlns:a14="http://schemas.microsoft.com/office/drawing/2010/main">
+        </p:spPr>
+        <p:txBody>
+          <a:bodyPr wrap="none" rtlCol="0">
+            <a:spAutoFit/>
+          </a:bodyPr>
+          <a:lstStyle/>
+          <a:p>
+            <a:r>
+              <a:rPr lang="de-DE" dirty="0" smtClean="0">
                 <a:solidFill>
-                  <a:srgbClr val="FFFFFF"/>
+                  <a:schemeClr val="tx1">
+                    <a:lumMod val="65000"/>
+                    <a:lumOff val="35000"/>
+                  </a:schemeClr>
                 </a:solidFill>
-              </a14:hiddenFill>
-            </a:ext>
-          </a:extLst>
-        </p:spPr>
-      </p:pic>
+              </a:rPr>
+              <a:t>Russell </a:t>
+            </a:r>
+            <a:r>
+              <a:rPr lang="de-DE" dirty="0" err="1" smtClean="0">
+                <a:solidFill>
+                  <a:schemeClr val="tx1">
+                    <a:lumMod val="65000"/>
+                    <a:lumOff val="35000"/>
+                  </a:schemeClr>
+                </a:solidFill>
+              </a:rPr>
+              <a:t>Aylott</a:t>
+            </a:r>
+            <a:r>
+              <a:rPr lang="de-DE" dirty="0" smtClean="0">
+                <a:solidFill>
+                  <a:schemeClr val="tx1">
+                    <a:lumMod val="65000"/>
+                    <a:lumOff val="35000"/>
+                  </a:schemeClr>
+                </a:solidFill>
+              </a:rPr>
+              <a:t>, Vincent-Wayne Mitchell</a:t>
+            </a:r>
+            <a:endParaRPr lang="de-DE" dirty="0">
+              <a:solidFill>
+                <a:schemeClr val="tx1">
+                  <a:lumMod val="65000"/>
+                  <a:lumOff val="35000"/>
+                </a:schemeClr>
+              </a:solidFill>
+            </a:endParaRPr>
+          </a:p>
+        </p:txBody>
+      </p:sp>
     </p:spTree>
     <p:extLst>
       <p:ext uri="{BB962C8B-B14F-4D97-AF65-F5344CB8AC3E}">

</xml_diff>